<commit_message>
Updating the presentation with more slides and a conclusion about which neighborhood is best.
</commit_message>
<xml_diff>
--- a/Finding a Night Club Location in New York.pptx
+++ b/Finding a Night Club Location in New York.pptx
@@ -12,10 +12,12 @@
     <p:sldId id="260" r:id="rId6"/>
     <p:sldId id="261" r:id="rId7"/>
     <p:sldId id="266" r:id="rId8"/>
-    <p:sldId id="263" r:id="rId9"/>
-    <p:sldId id="264" r:id="rId10"/>
-    <p:sldId id="265" r:id="rId11"/>
-    <p:sldId id="258" r:id="rId12"/>
+    <p:sldId id="267" r:id="rId9"/>
+    <p:sldId id="263" r:id="rId10"/>
+    <p:sldId id="268" r:id="rId11"/>
+    <p:sldId id="264" r:id="rId12"/>
+    <p:sldId id="265" r:id="rId13"/>
+    <p:sldId id="258" r:id="rId14"/>
   </p:sldIdLst>
   <p:sldSz cx="12192000" cy="6858000"/>
   <p:notesSz cx="6858000" cy="9144000"/>
@@ -114,6 +116,11 @@
       </a:defRPr>
     </a:lvl9pPr>
   </p:defaultTextStyle>
+  <p:extLst>
+    <p:ext uri="{EFAFB233-063F-42B5-8137-9DF3F51BA10A}">
+      <p15:sldGuideLst xmlns:p15="http://schemas.microsoft.com/office/powerpoint/2012/main"/>
+    </p:ext>
+  </p:extLst>
 </p:presentation>
 </file>
 
@@ -5840,6 +5847,208 @@
             <p:ph type="title"/>
           </p:nvPr>
         </p:nvSpPr>
+        <p:spPr>
+          <a:xfrm>
+            <a:off x="2884311" y="534724"/>
+            <a:ext cx="8610600" cy="1293028"/>
+          </a:xfrm>
+        </p:spPr>
+        <p:txBody>
+          <a:bodyPr/>
+          <a:lstStyle/>
+          <a:p>
+            <a:r>
+              <a:rPr lang="en-US" dirty="0" smtClean="0"/>
+              <a:t>Plotting the Only clubs that have a Rating</a:t>
+            </a:r>
+            <a:endParaRPr lang="en-US" dirty="0"/>
+          </a:p>
+        </p:txBody>
+      </p:sp>
+      <p:pic>
+        <p:nvPicPr>
+          <p:cNvPr id="5" name="Picture 4"/>
+          <p:cNvPicPr>
+            <a:picLocks noChangeAspect="1"/>
+          </p:cNvPicPr>
+          <p:nvPr/>
+        </p:nvPicPr>
+        <p:blipFill>
+          <a:blip r:embed="rId2"/>
+          <a:stretch>
+            <a:fillRect/>
+          </a:stretch>
+        </p:blipFill>
+        <p:spPr>
+          <a:xfrm>
+            <a:off x="2291644" y="1906775"/>
+            <a:ext cx="7141104" cy="4817825"/>
+          </a:xfrm>
+          <a:prstGeom prst="rect">
+            <a:avLst/>
+          </a:prstGeom>
+        </p:spPr>
+      </p:pic>
+    </p:spTree>
+    <p:extLst>
+      <p:ext uri="{BB962C8B-B14F-4D97-AF65-F5344CB8AC3E}">
+        <p14:creationId xmlns:p14="http://schemas.microsoft.com/office/powerpoint/2010/main" val="3529631993"/>
+      </p:ext>
+    </p:extLst>
+  </p:cSld>
+  <p:clrMapOvr>
+    <a:masterClrMapping/>
+  </p:clrMapOvr>
+</p:sld>
+</file>
+
+<file path=ppt/slides/slide11.xml><?xml version="1.0" encoding="utf-8"?>
+<p:sld xmlns:a="http://schemas.openxmlformats.org/drawingml/2006/main" xmlns:r="http://schemas.openxmlformats.org/officeDocument/2006/relationships" xmlns:p="http://schemas.openxmlformats.org/presentationml/2006/main">
+  <p:cSld>
+    <p:spTree>
+      <p:nvGrpSpPr>
+        <p:cNvPr id="1" name=""/>
+        <p:cNvGrpSpPr/>
+        <p:nvPr/>
+      </p:nvGrpSpPr>
+      <p:grpSpPr>
+        <a:xfrm>
+          <a:off x="0" y="0"/>
+          <a:ext cx="0" cy="0"/>
+          <a:chOff x="0" y="0"/>
+          <a:chExt cx="0" cy="0"/>
+        </a:xfrm>
+      </p:grpSpPr>
+      <p:sp>
+        <p:nvSpPr>
+          <p:cNvPr id="2" name="Title 1"/>
+          <p:cNvSpPr>
+            <a:spLocks noGrp="1"/>
+          </p:cNvSpPr>
+          <p:nvPr>
+            <p:ph type="title"/>
+          </p:nvPr>
+        </p:nvSpPr>
+        <p:spPr/>
+        <p:txBody>
+          <a:bodyPr/>
+          <a:lstStyle/>
+          <a:p>
+            <a:r>
+              <a:rPr lang="en-US" dirty="0" smtClean="0"/>
+              <a:t>Clustering by Location and Rating</a:t>
+            </a:r>
+            <a:endParaRPr lang="en-US" dirty="0"/>
+          </a:p>
+        </p:txBody>
+      </p:sp>
+      <p:pic>
+        <p:nvPicPr>
+          <p:cNvPr id="5" name="Picture 4"/>
+          <p:cNvPicPr>
+            <a:picLocks noChangeAspect="1"/>
+          </p:cNvPicPr>
+          <p:nvPr/>
+        </p:nvPicPr>
+        <p:blipFill>
+          <a:blip r:embed="rId2"/>
+          <a:stretch>
+            <a:fillRect/>
+          </a:stretch>
+        </p:blipFill>
+        <p:spPr>
+          <a:xfrm>
+            <a:off x="428978" y="1410887"/>
+            <a:ext cx="9057217" cy="5419172"/>
+          </a:xfrm>
+          <a:prstGeom prst="rect">
+            <a:avLst/>
+          </a:prstGeom>
+        </p:spPr>
+      </p:pic>
+      <p:sp>
+        <p:nvSpPr>
+          <p:cNvPr id="6" name="TextBox 5"/>
+          <p:cNvSpPr txBox="1"/>
+          <p:nvPr/>
+        </p:nvSpPr>
+        <p:spPr>
+          <a:xfrm>
+            <a:off x="9580388" y="2946399"/>
+            <a:ext cx="2611612" cy="646331"/>
+          </a:xfrm>
+          <a:prstGeom prst="rect">
+            <a:avLst/>
+          </a:prstGeom>
+          <a:noFill/>
+        </p:spPr>
+        <p:txBody>
+          <a:bodyPr wrap="none" rtlCol="0">
+            <a:spAutoFit/>
+          </a:bodyPr>
+          <a:lstStyle/>
+          <a:p>
+            <a:pPr marL="285750" indent="-285750">
+              <a:buFont typeface="Arial" panose="020B0604020202020204" pitchFamily="34" charset="0"/>
+              <a:buChar char="•"/>
+            </a:pPr>
+            <a:r>
+              <a:rPr lang="en-US" dirty="0" smtClean="0"/>
+              <a:t>K-means Clustering</a:t>
+            </a:r>
+          </a:p>
+          <a:p>
+            <a:pPr marL="285750" indent="-285750">
+              <a:buFont typeface="Arial" panose="020B0604020202020204" pitchFamily="34" charset="0"/>
+              <a:buChar char="•"/>
+            </a:pPr>
+            <a:r>
+              <a:rPr lang="en-US" dirty="0" smtClean="0"/>
+              <a:t>3 centroids</a:t>
+            </a:r>
+          </a:p>
+        </p:txBody>
+      </p:sp>
+    </p:spTree>
+    <p:extLst>
+      <p:ext uri="{BB962C8B-B14F-4D97-AF65-F5344CB8AC3E}">
+        <p14:creationId xmlns:p14="http://schemas.microsoft.com/office/powerpoint/2010/main" val="2519066994"/>
+      </p:ext>
+    </p:extLst>
+  </p:cSld>
+  <p:clrMapOvr>
+    <a:masterClrMapping/>
+  </p:clrMapOvr>
+</p:sld>
+</file>
+
+<file path=ppt/slides/slide12.xml><?xml version="1.0" encoding="utf-8"?>
+<p:sld xmlns:a="http://schemas.openxmlformats.org/drawingml/2006/main" xmlns:r="http://schemas.openxmlformats.org/officeDocument/2006/relationships" xmlns:p="http://schemas.openxmlformats.org/presentationml/2006/main">
+  <p:cSld>
+    <p:spTree>
+      <p:nvGrpSpPr>
+        <p:cNvPr id="1" name=""/>
+        <p:cNvGrpSpPr/>
+        <p:nvPr/>
+      </p:nvGrpSpPr>
+      <p:grpSpPr>
+        <a:xfrm>
+          <a:off x="0" y="0"/>
+          <a:ext cx="0" cy="0"/>
+          <a:chOff x="0" y="0"/>
+          <a:chExt cx="0" cy="0"/>
+        </a:xfrm>
+      </p:grpSpPr>
+      <p:sp>
+        <p:nvSpPr>
+          <p:cNvPr id="2" name="Title 1"/>
+          <p:cNvSpPr>
+            <a:spLocks noGrp="1"/>
+          </p:cNvSpPr>
+          <p:nvPr>
+            <p:ph type="title"/>
+          </p:nvPr>
+        </p:nvSpPr>
         <p:spPr/>
         <p:txBody>
           <a:bodyPr/>
@@ -5868,7 +6077,55 @@
           <a:bodyPr/>
           <a:lstStyle/>
           <a:p>
-            <a:endParaRPr lang="en-US"/>
+            <a:r>
+              <a:rPr lang="en-US" dirty="0" smtClean="0"/>
+              <a:t>Using K-means clustering</a:t>
+            </a:r>
+          </a:p>
+          <a:p>
+            <a:r>
+              <a:rPr lang="en-US" dirty="0" smtClean="0"/>
+              <a:t>Three distinct clusters were used</a:t>
+            </a:r>
+          </a:p>
+          <a:p>
+            <a:r>
+              <a:rPr lang="en-US" dirty="0" smtClean="0"/>
+              <a:t>The average rating produced for each cluster was compared.</a:t>
+            </a:r>
+          </a:p>
+          <a:p>
+            <a:r>
+              <a:rPr lang="en-US" dirty="0" smtClean="0"/>
+              <a:t>Only 1 cluster had a positive rating</a:t>
+            </a:r>
+          </a:p>
+          <a:p>
+            <a:r>
+              <a:rPr lang="en-US" dirty="0" smtClean="0"/>
+              <a:t>It also contained the most clubs with positive ratings</a:t>
+            </a:r>
+          </a:p>
+          <a:p>
+            <a:r>
+              <a:rPr lang="en-US" dirty="0" smtClean="0"/>
+              <a:t>The neighborhood seemed more resilient to a downturn in the economy due to </a:t>
+            </a:r>
+            <a:r>
+              <a:rPr lang="en-US" dirty="0" err="1" smtClean="0"/>
+              <a:t>covid</a:t>
+            </a:r>
+            <a:r>
+              <a:rPr lang="en-US" dirty="0" smtClean="0"/>
+              <a:t>. More open clubs mean that location is </a:t>
+            </a:r>
+            <a:r>
+              <a:rPr lang="en-US" smtClean="0"/>
+              <a:t>fairing better.</a:t>
+            </a:r>
+          </a:p>
+          <a:p>
+            <a:endParaRPr lang="en-US" dirty="0"/>
           </a:p>
         </p:txBody>
       </p:sp>
@@ -5885,7 +6142,7 @@
 </p:sld>
 </file>
 
-<file path=ppt/slides/slide11.xml><?xml version="1.0" encoding="utf-8"?>
+<file path=ppt/slides/slide13.xml><?xml version="1.0" encoding="utf-8"?>
 <p:sld xmlns:a="http://schemas.openxmlformats.org/drawingml/2006/main" xmlns:r="http://schemas.openxmlformats.org/officeDocument/2006/relationships" xmlns:p="http://schemas.openxmlformats.org/presentationml/2006/main">
   <p:cSld>
     <p:spTree>
@@ -6160,13 +6417,18 @@
               <a:t>Foursquare API used to get Night Clubs based on distance from </a:t>
             </a:r>
             <a:r>
-              <a:rPr lang="en-US" dirty="0" err="1" smtClean="0"/>
-              <a:t>geographicl</a:t>
-            </a:r>
-            <a:r>
               <a:rPr lang="en-US" dirty="0" smtClean="0"/>
-              <a:t> centers of neighborhoods</a:t>
-            </a:r>
+              <a:t>geographical </a:t>
+            </a:r>
+            <a:r>
+              <a:rPr lang="en-US" dirty="0" smtClean="0"/>
+              <a:t>centers of </a:t>
+            </a:r>
+            <a:r>
+              <a:rPr lang="en-US" dirty="0" smtClean="0"/>
+              <a:t>neighborhoods</a:t>
+            </a:r>
+            <a:endParaRPr lang="en-US" dirty="0" smtClean="0"/>
           </a:p>
           <a:p>
             <a:endParaRPr lang="en-US" dirty="0" smtClean="0"/>
@@ -6226,25 +6488,30 @@
           </a:p>
         </p:txBody>
       </p:sp>
-      <p:sp>
-        <p:nvSpPr>
-          <p:cNvPr id="3" name="Content Placeholder 2"/>
-          <p:cNvSpPr>
-            <a:spLocks noGrp="1"/>
-          </p:cNvSpPr>
-          <p:nvPr>
-            <p:ph idx="1"/>
-          </p:nvPr>
-        </p:nvSpPr>
-        <p:spPr/>
-        <p:txBody>
-          <a:bodyPr/>
-          <a:lstStyle/>
-          <a:p>
-            <a:endParaRPr lang="en-US"/>
-          </a:p>
-        </p:txBody>
-      </p:sp>
+      <p:pic>
+        <p:nvPicPr>
+          <p:cNvPr id="4" name="Picture 3"/>
+          <p:cNvPicPr>
+            <a:picLocks noChangeAspect="1"/>
+          </p:cNvPicPr>
+          <p:nvPr/>
+        </p:nvPicPr>
+        <p:blipFill>
+          <a:blip r:embed="rId2"/>
+          <a:stretch>
+            <a:fillRect/>
+          </a:stretch>
+        </p:blipFill>
+        <p:spPr>
+          <a:xfrm>
+            <a:off x="1577641" y="2057401"/>
+            <a:ext cx="7726167" cy="4645378"/>
+          </a:xfrm>
+          <a:prstGeom prst="rect">
+            <a:avLst/>
+          </a:prstGeom>
+        </p:spPr>
+      </p:pic>
     </p:spTree>
     <p:extLst>
       <p:ext uri="{BB962C8B-B14F-4D97-AF65-F5344CB8AC3E}">
@@ -6298,25 +6565,30 @@
           </a:p>
         </p:txBody>
       </p:sp>
-      <p:sp>
-        <p:nvSpPr>
-          <p:cNvPr id="3" name="Content Placeholder 2"/>
-          <p:cNvSpPr>
-            <a:spLocks noGrp="1"/>
-          </p:cNvSpPr>
-          <p:nvPr>
-            <p:ph idx="1"/>
-          </p:nvPr>
-        </p:nvSpPr>
-        <p:spPr/>
-        <p:txBody>
-          <a:bodyPr/>
-          <a:lstStyle/>
-          <a:p>
-            <a:endParaRPr lang="en-US"/>
-          </a:p>
-        </p:txBody>
-      </p:sp>
+      <p:pic>
+        <p:nvPicPr>
+          <p:cNvPr id="4" name="Picture 3"/>
+          <p:cNvPicPr>
+            <a:picLocks noChangeAspect="1"/>
+          </p:cNvPicPr>
+          <p:nvPr/>
+        </p:nvPicPr>
+        <p:blipFill>
+          <a:blip r:embed="rId2"/>
+          <a:stretch>
+            <a:fillRect/>
+          </a:stretch>
+        </p:blipFill>
+        <p:spPr>
+          <a:xfrm>
+            <a:off x="1602988" y="1930399"/>
+            <a:ext cx="7857101" cy="4712619"/>
+          </a:xfrm>
+          <a:prstGeom prst="rect">
+            <a:avLst/>
+          </a:prstGeom>
+        </p:spPr>
+      </p:pic>
     </p:spTree>
     <p:extLst>
       <p:ext uri="{BB962C8B-B14F-4D97-AF65-F5344CB8AC3E}">
@@ -6364,7 +6636,11 @@
           <a:p>
             <a:r>
               <a:rPr lang="en-US" dirty="0" smtClean="0"/>
-              <a:t>Choosing the  Top Neighborhoods</a:t>
+              <a:t>Ranking </a:t>
+            </a:r>
+            <a:r>
+              <a:rPr lang="en-US" dirty="0" smtClean="0"/>
+              <a:t>the  Top Neighborhoods</a:t>
             </a:r>
             <a:endParaRPr lang="en-US" dirty="0"/>
           </a:p>
@@ -6400,6 +6676,46 @@
           </a:prstGeom>
         </p:spPr>
       </p:pic>
+      <p:sp>
+        <p:nvSpPr>
+          <p:cNvPr id="3" name="Rectangle 2"/>
+          <p:cNvSpPr/>
+          <p:nvPr/>
+        </p:nvSpPr>
+        <p:spPr>
+          <a:xfrm>
+            <a:off x="1749778" y="2596445"/>
+            <a:ext cx="1264355" cy="4117624"/>
+          </a:xfrm>
+          <a:prstGeom prst="rect">
+            <a:avLst/>
+          </a:prstGeom>
+          <a:noFill/>
+          <a:ln w="38100"/>
+        </p:spPr>
+        <p:style>
+          <a:lnRef idx="2">
+            <a:schemeClr val="accent1"/>
+          </a:lnRef>
+          <a:fillRef idx="1">
+            <a:schemeClr val="lt1"/>
+          </a:fillRef>
+          <a:effectRef idx="0">
+            <a:schemeClr val="accent1"/>
+          </a:effectRef>
+          <a:fontRef idx="minor">
+            <a:schemeClr val="dk1"/>
+          </a:fontRef>
+        </p:style>
+        <p:txBody>
+          <a:bodyPr rtlCol="0" anchor="ctr"/>
+          <a:lstStyle/>
+          <a:p>
+            <a:pPr algn="ctr"/>
+            <a:endParaRPr lang="en-US"/>
+          </a:p>
+        </p:txBody>
+      </p:sp>
     </p:spTree>
     <p:extLst>
       <p:ext uri="{BB962C8B-B14F-4D97-AF65-F5344CB8AC3E}">
@@ -6450,12 +6766,12 @@
               <a:t>Five </a:t>
             </a:r>
             <a:r>
-              <a:rPr lang="en-US" dirty="0" err="1" smtClean="0"/>
-              <a:t>NeighBorhoods</a:t>
-            </a:r>
-            <a:r>
               <a:rPr lang="en-US" dirty="0" smtClean="0"/>
-              <a:t> with the most clubs</a:t>
+              <a:t>Neighborhoods </a:t>
+            </a:r>
+            <a:r>
+              <a:rPr lang="en-US" dirty="0" smtClean="0"/>
+              <a:t>with the most clubs</a:t>
             </a:r>
             <a:endParaRPr lang="en-US" dirty="0"/>
           </a:p>
@@ -6531,6 +6847,34 @@
             <p:ph type="title"/>
           </p:nvPr>
         </p:nvSpPr>
+        <p:spPr>
+          <a:xfrm>
+            <a:off x="2619022" y="764373"/>
+            <a:ext cx="8887178" cy="1293028"/>
+          </a:xfrm>
+        </p:spPr>
+        <p:txBody>
+          <a:bodyPr/>
+          <a:lstStyle/>
+          <a:p>
+            <a:r>
+              <a:rPr lang="en-US" dirty="0" smtClean="0"/>
+              <a:t>Limitations Because of Covid-19</a:t>
+            </a:r>
+            <a:endParaRPr lang="en-US" dirty="0"/>
+          </a:p>
+        </p:txBody>
+      </p:sp>
+      <p:sp>
+        <p:nvSpPr>
+          <p:cNvPr id="3" name="Content Placeholder 2"/>
+          <p:cNvSpPr>
+            <a:spLocks noGrp="1"/>
+          </p:cNvSpPr>
+          <p:nvPr>
+            <p:ph idx="1"/>
+          </p:nvPr>
+        </p:nvSpPr>
         <p:spPr/>
         <p:txBody>
           <a:bodyPr/>
@@ -6538,35 +6882,53 @@
           <a:p>
             <a:r>
               <a:rPr lang="en-US" dirty="0" smtClean="0"/>
-              <a:t>Adding the Average Club Rating</a:t>
+              <a:t>Many clubs in New York at this time are closed</a:t>
+            </a:r>
+          </a:p>
+          <a:p>
+            <a:r>
+              <a:rPr lang="en-US" dirty="0" smtClean="0"/>
+              <a:t>Many clubs didn’t have foursquare IDs to pull additional information</a:t>
+            </a:r>
+          </a:p>
+          <a:p>
+            <a:r>
+              <a:rPr lang="en-US" dirty="0" smtClean="0"/>
+              <a:t>Rating information was not available on all Night Clubs because of the closing</a:t>
+            </a:r>
+          </a:p>
+          <a:p>
+            <a:r>
+              <a:rPr lang="en-US" dirty="0" smtClean="0"/>
+              <a:t>Any club that did not have a rating was assigned a penalty of -1. </a:t>
+            </a:r>
+          </a:p>
+          <a:p>
+            <a:pPr lvl="1"/>
+            <a:r>
+              <a:rPr lang="en-US" dirty="0" smtClean="0"/>
+              <a:t>Any areas with many closed clubs would have a large penalty</a:t>
+            </a:r>
+          </a:p>
+          <a:p>
+            <a:r>
+              <a:rPr lang="en-US" dirty="0" smtClean="0"/>
+              <a:t>The assumption is it’s better to open a club any club in an area with other open clubs instead of an area with no clubs.</a:t>
+            </a:r>
+          </a:p>
+          <a:p>
+            <a:r>
+              <a:rPr lang="en-US" dirty="0" smtClean="0"/>
+              <a:t>That is some night life is better than no night life</a:t>
             </a:r>
             <a:endParaRPr lang="en-US" dirty="0"/>
-          </a:p>
-        </p:txBody>
-      </p:sp>
-      <p:sp>
-        <p:nvSpPr>
-          <p:cNvPr id="3" name="Content Placeholder 2"/>
-          <p:cNvSpPr>
-            <a:spLocks noGrp="1"/>
-          </p:cNvSpPr>
-          <p:nvPr>
-            <p:ph idx="1"/>
-          </p:nvPr>
-        </p:nvSpPr>
-        <p:spPr/>
-        <p:txBody>
-          <a:bodyPr/>
-          <a:lstStyle/>
-          <a:p>
-            <a:endParaRPr lang="en-US"/>
           </a:p>
         </p:txBody>
       </p:sp>
     </p:spTree>
     <p:extLst>
       <p:ext uri="{BB962C8B-B14F-4D97-AF65-F5344CB8AC3E}">
-        <p14:creationId xmlns:p14="http://schemas.microsoft.com/office/powerpoint/2010/main" val="1269311814"/>
+        <p14:creationId xmlns:p14="http://schemas.microsoft.com/office/powerpoint/2010/main" val="886729842"/>
       </p:ext>
     </p:extLst>
   </p:cSld>
@@ -6610,35 +6972,46 @@
           <a:p>
             <a:r>
               <a:rPr lang="en-US" dirty="0" smtClean="0"/>
-              <a:t>Clustering by Location and Rating</a:t>
+              <a:t>Adding the Average Club Rating</a:t>
             </a:r>
             <a:endParaRPr lang="en-US" dirty="0"/>
           </a:p>
         </p:txBody>
       </p:sp>
-      <p:sp>
-        <p:nvSpPr>
-          <p:cNvPr id="3" name="Content Placeholder 2"/>
-          <p:cNvSpPr>
-            <a:spLocks noGrp="1"/>
-          </p:cNvSpPr>
-          <p:nvPr>
-            <p:ph idx="1"/>
-          </p:nvPr>
-        </p:nvSpPr>
-        <p:spPr/>
-        <p:txBody>
-          <a:bodyPr/>
-          <a:lstStyle/>
-          <a:p>
-            <a:endParaRPr lang="en-US"/>
-          </a:p>
-        </p:txBody>
-      </p:sp>
+      <p:pic>
+        <p:nvPicPr>
+          <p:cNvPr id="5" name="Picture 4"/>
+          <p:cNvPicPr>
+            <a:picLocks noChangeAspect="1"/>
+          </p:cNvPicPr>
+          <p:nvPr/>
+        </p:nvPicPr>
+        <p:blipFill>
+          <a:blip r:embed="rId2">
+            <a:extLst>
+              <a:ext uri="{28A0092B-C50C-407E-A947-70E740481C1C}">
+                <a14:useLocalDpi xmlns:a14="http://schemas.microsoft.com/office/drawing/2010/main" val="0"/>
+              </a:ext>
+            </a:extLst>
+          </a:blip>
+          <a:stretch>
+            <a:fillRect/>
+          </a:stretch>
+        </p:blipFill>
+        <p:spPr>
+          <a:xfrm>
+            <a:off x="974354" y="1930400"/>
+            <a:ext cx="9682806" cy="4820356"/>
+          </a:xfrm>
+          <a:prstGeom prst="rect">
+            <a:avLst/>
+          </a:prstGeom>
+        </p:spPr>
+      </p:pic>
     </p:spTree>
     <p:extLst>
       <p:ext uri="{BB962C8B-B14F-4D97-AF65-F5344CB8AC3E}">
-        <p14:creationId xmlns:p14="http://schemas.microsoft.com/office/powerpoint/2010/main" val="2519066994"/>
+        <p14:creationId xmlns:p14="http://schemas.microsoft.com/office/powerpoint/2010/main" val="1269311814"/>
       </p:ext>
     </p:extLst>
   </p:cSld>

</xml_diff>

<commit_message>
Adding some considerations slide and some limitations.
</commit_message>
<xml_diff>
--- a/Finding a Night Club Location in New York.pptx
+++ b/Finding a Night Club Location in New York.pptx
@@ -7,17 +7,18 @@
   <p:sldIdLst>
     <p:sldId id="256" r:id="rId2"/>
     <p:sldId id="257" r:id="rId3"/>
-    <p:sldId id="259" r:id="rId4"/>
-    <p:sldId id="262" r:id="rId5"/>
-    <p:sldId id="260" r:id="rId6"/>
-    <p:sldId id="261" r:id="rId7"/>
-    <p:sldId id="266" r:id="rId8"/>
-    <p:sldId id="267" r:id="rId9"/>
-    <p:sldId id="263" r:id="rId10"/>
-    <p:sldId id="268" r:id="rId11"/>
-    <p:sldId id="264" r:id="rId12"/>
-    <p:sldId id="265" r:id="rId13"/>
-    <p:sldId id="258" r:id="rId14"/>
+    <p:sldId id="269" r:id="rId4"/>
+    <p:sldId id="259" r:id="rId5"/>
+    <p:sldId id="262" r:id="rId6"/>
+    <p:sldId id="260" r:id="rId7"/>
+    <p:sldId id="261" r:id="rId8"/>
+    <p:sldId id="266" r:id="rId9"/>
+    <p:sldId id="267" r:id="rId10"/>
+    <p:sldId id="263" r:id="rId11"/>
+    <p:sldId id="268" r:id="rId12"/>
+    <p:sldId id="264" r:id="rId13"/>
+    <p:sldId id="265" r:id="rId14"/>
+    <p:sldId id="258" r:id="rId15"/>
   </p:sldIdLst>
   <p:sldSz cx="12192000" cy="6858000"/>
   <p:notesSz cx="6858000" cy="9144000"/>
@@ -5847,19 +5848,14 @@
             <p:ph type="title"/>
           </p:nvPr>
         </p:nvSpPr>
-        <p:spPr>
-          <a:xfrm>
-            <a:off x="2884311" y="534724"/>
-            <a:ext cx="8610600" cy="1293028"/>
-          </a:xfrm>
-        </p:spPr>
+        <p:spPr/>
         <p:txBody>
           <a:bodyPr/>
           <a:lstStyle/>
           <a:p>
             <a:r>
               <a:rPr lang="en-US" dirty="0" smtClean="0"/>
-              <a:t>Plotting the Only clubs that have a Rating</a:t>
+              <a:t>Adding the Average Club Rating</a:t>
             </a:r>
             <a:endParaRPr lang="en-US" dirty="0"/>
           </a:p>
@@ -5874,15 +5870,21 @@
           <p:nvPr/>
         </p:nvPicPr>
         <p:blipFill>
-          <a:blip r:embed="rId2"/>
+          <a:blip r:embed="rId2">
+            <a:extLst>
+              <a:ext uri="{28A0092B-C50C-407E-A947-70E740481C1C}">
+                <a14:useLocalDpi xmlns:a14="http://schemas.microsoft.com/office/drawing/2010/main" val="0"/>
+              </a:ext>
+            </a:extLst>
+          </a:blip>
           <a:stretch>
             <a:fillRect/>
           </a:stretch>
         </p:blipFill>
         <p:spPr>
           <a:xfrm>
-            <a:off x="2291644" y="1906775"/>
-            <a:ext cx="7141104" cy="4817825"/>
+            <a:off x="974354" y="1930400"/>
+            <a:ext cx="9682806" cy="4820356"/>
           </a:xfrm>
           <a:prstGeom prst="rect">
             <a:avLst/>
@@ -5892,7 +5894,7 @@
     </p:spTree>
     <p:extLst>
       <p:ext uri="{BB962C8B-B14F-4D97-AF65-F5344CB8AC3E}">
-        <p14:creationId xmlns:p14="http://schemas.microsoft.com/office/powerpoint/2010/main" val="3529631993"/>
+        <p14:creationId xmlns:p14="http://schemas.microsoft.com/office/powerpoint/2010/main" val="1269311814"/>
       </p:ext>
     </p:extLst>
   </p:cSld>
@@ -5929,14 +5931,19 @@
             <p:ph type="title"/>
           </p:nvPr>
         </p:nvSpPr>
-        <p:spPr/>
+        <p:spPr>
+          <a:xfrm>
+            <a:off x="2884311" y="534724"/>
+            <a:ext cx="8610600" cy="1293028"/>
+          </a:xfrm>
+        </p:spPr>
         <p:txBody>
           <a:bodyPr/>
           <a:lstStyle/>
           <a:p>
             <a:r>
               <a:rPr lang="en-US" dirty="0" smtClean="0"/>
-              <a:t>Clustering by Location and Rating</a:t>
+              <a:t>Plotting the Only clubs that have a Rating</a:t>
             </a:r>
             <a:endParaRPr lang="en-US" dirty="0"/>
           </a:p>
@@ -5958,61 +5965,18 @@
         </p:blipFill>
         <p:spPr>
           <a:xfrm>
-            <a:off x="428978" y="1410887"/>
-            <a:ext cx="9057217" cy="5419172"/>
+            <a:off x="2291644" y="1906775"/>
+            <a:ext cx="7141104" cy="4817825"/>
           </a:xfrm>
           <a:prstGeom prst="rect">
             <a:avLst/>
           </a:prstGeom>
         </p:spPr>
       </p:pic>
-      <p:sp>
-        <p:nvSpPr>
-          <p:cNvPr id="6" name="TextBox 5"/>
-          <p:cNvSpPr txBox="1"/>
-          <p:nvPr/>
-        </p:nvSpPr>
-        <p:spPr>
-          <a:xfrm>
-            <a:off x="9580388" y="2946399"/>
-            <a:ext cx="2611612" cy="646331"/>
-          </a:xfrm>
-          <a:prstGeom prst="rect">
-            <a:avLst/>
-          </a:prstGeom>
-          <a:noFill/>
-        </p:spPr>
-        <p:txBody>
-          <a:bodyPr wrap="none" rtlCol="0">
-            <a:spAutoFit/>
-          </a:bodyPr>
-          <a:lstStyle/>
-          <a:p>
-            <a:pPr marL="285750" indent="-285750">
-              <a:buFont typeface="Arial" panose="020B0604020202020204" pitchFamily="34" charset="0"/>
-              <a:buChar char="•"/>
-            </a:pPr>
-            <a:r>
-              <a:rPr lang="en-US" dirty="0" smtClean="0"/>
-              <a:t>K-means Clustering</a:t>
-            </a:r>
-          </a:p>
-          <a:p>
-            <a:pPr marL="285750" indent="-285750">
-              <a:buFont typeface="Arial" panose="020B0604020202020204" pitchFamily="34" charset="0"/>
-              <a:buChar char="•"/>
-            </a:pPr>
-            <a:r>
-              <a:rPr lang="en-US" dirty="0" smtClean="0"/>
-              <a:t>3 centroids</a:t>
-            </a:r>
-          </a:p>
-        </p:txBody>
-      </p:sp>
     </p:spTree>
     <p:extLst>
       <p:ext uri="{BB962C8B-B14F-4D97-AF65-F5344CB8AC3E}">
-        <p14:creationId xmlns:p14="http://schemas.microsoft.com/office/powerpoint/2010/main" val="2519066994"/>
+        <p14:creationId xmlns:p14="http://schemas.microsoft.com/office/powerpoint/2010/main" val="3529631993"/>
       </p:ext>
     </p:extLst>
   </p:cSld>
@@ -6056,83 +6020,83 @@
           <a:p>
             <a:r>
               <a:rPr lang="en-US" dirty="0" smtClean="0"/>
-              <a:t>Picking the best Neighborhood</a:t>
+              <a:t>Clustering by Location and Rating</a:t>
             </a:r>
             <a:endParaRPr lang="en-US" dirty="0"/>
           </a:p>
         </p:txBody>
       </p:sp>
-      <p:sp>
-        <p:nvSpPr>
-          <p:cNvPr id="3" name="Content Placeholder 2"/>
-          <p:cNvSpPr>
-            <a:spLocks noGrp="1"/>
-          </p:cNvSpPr>
-          <p:nvPr>
-            <p:ph idx="1"/>
-          </p:nvPr>
-        </p:nvSpPr>
-        <p:spPr/>
-        <p:txBody>
-          <a:bodyPr/>
-          <a:lstStyle/>
-          <a:p>
+      <p:pic>
+        <p:nvPicPr>
+          <p:cNvPr id="5" name="Picture 4"/>
+          <p:cNvPicPr>
+            <a:picLocks noChangeAspect="1"/>
+          </p:cNvPicPr>
+          <p:nvPr/>
+        </p:nvPicPr>
+        <p:blipFill>
+          <a:blip r:embed="rId2"/>
+          <a:stretch>
+            <a:fillRect/>
+          </a:stretch>
+        </p:blipFill>
+        <p:spPr>
+          <a:xfrm>
+            <a:off x="428978" y="1410887"/>
+            <a:ext cx="9057217" cy="5419172"/>
+          </a:xfrm>
+          <a:prstGeom prst="rect">
+            <a:avLst/>
+          </a:prstGeom>
+        </p:spPr>
+      </p:pic>
+      <p:sp>
+        <p:nvSpPr>
+          <p:cNvPr id="6" name="TextBox 5"/>
+          <p:cNvSpPr txBox="1"/>
+          <p:nvPr/>
+        </p:nvSpPr>
+        <p:spPr>
+          <a:xfrm>
+            <a:off x="9580388" y="2946399"/>
+            <a:ext cx="2611612" cy="646331"/>
+          </a:xfrm>
+          <a:prstGeom prst="rect">
+            <a:avLst/>
+          </a:prstGeom>
+          <a:noFill/>
+        </p:spPr>
+        <p:txBody>
+          <a:bodyPr wrap="none" rtlCol="0">
+            <a:spAutoFit/>
+          </a:bodyPr>
+          <a:lstStyle/>
+          <a:p>
+            <a:pPr marL="285750" indent="-285750">
+              <a:buFont typeface="Arial" panose="020B0604020202020204" pitchFamily="34" charset="0"/>
+              <a:buChar char="•"/>
+            </a:pPr>
             <a:r>
               <a:rPr lang="en-US" dirty="0" smtClean="0"/>
-              <a:t>Using K-means clustering</a:t>
-            </a:r>
-          </a:p>
-          <a:p>
+              <a:t>K-means Clustering</a:t>
+            </a:r>
+          </a:p>
+          <a:p>
+            <a:pPr marL="285750" indent="-285750">
+              <a:buFont typeface="Arial" panose="020B0604020202020204" pitchFamily="34" charset="0"/>
+              <a:buChar char="•"/>
+            </a:pPr>
             <a:r>
               <a:rPr lang="en-US" dirty="0" smtClean="0"/>
-              <a:t>Three distinct clusters were used</a:t>
-            </a:r>
-          </a:p>
-          <a:p>
-            <a:r>
-              <a:rPr lang="en-US" dirty="0" smtClean="0"/>
-              <a:t>The average rating produced for each cluster was compared.</a:t>
-            </a:r>
-          </a:p>
-          <a:p>
-            <a:r>
-              <a:rPr lang="en-US" dirty="0" smtClean="0"/>
-              <a:t>Only 1 cluster had a positive rating</a:t>
-            </a:r>
-          </a:p>
-          <a:p>
-            <a:r>
-              <a:rPr lang="en-US" dirty="0" smtClean="0"/>
-              <a:t>It also contained the most clubs with positive ratings</a:t>
-            </a:r>
-          </a:p>
-          <a:p>
-            <a:r>
-              <a:rPr lang="en-US" dirty="0" smtClean="0"/>
-              <a:t>The neighborhood seemed more resilient to a downturn in the economy due to </a:t>
-            </a:r>
-            <a:r>
-              <a:rPr lang="en-US" dirty="0" err="1" smtClean="0"/>
-              <a:t>covid</a:t>
-            </a:r>
-            <a:r>
-              <a:rPr lang="en-US" dirty="0" smtClean="0"/>
-              <a:t>. More open clubs mean that location is </a:t>
-            </a:r>
-            <a:r>
-              <a:rPr lang="en-US" smtClean="0"/>
-              <a:t>fairing better.</a:t>
-            </a:r>
-          </a:p>
-          <a:p>
-            <a:endParaRPr lang="en-US" dirty="0"/>
+              <a:t>3 centroids</a:t>
+            </a:r>
           </a:p>
         </p:txBody>
       </p:sp>
     </p:spTree>
     <p:extLst>
       <p:ext uri="{BB962C8B-B14F-4D97-AF65-F5344CB8AC3E}">
-        <p14:creationId xmlns:p14="http://schemas.microsoft.com/office/powerpoint/2010/main" val="3201624142"/>
+        <p14:creationId xmlns:p14="http://schemas.microsoft.com/office/powerpoint/2010/main" val="2519066994"/>
       </p:ext>
     </p:extLst>
   </p:cSld>
@@ -6176,6 +6140,132 @@
           <a:p>
             <a:r>
               <a:rPr lang="en-US" dirty="0" smtClean="0"/>
+              <a:t>Picking the best Neighborhood</a:t>
+            </a:r>
+            <a:endParaRPr lang="en-US" dirty="0"/>
+          </a:p>
+        </p:txBody>
+      </p:sp>
+      <p:sp>
+        <p:nvSpPr>
+          <p:cNvPr id="3" name="Content Placeholder 2"/>
+          <p:cNvSpPr>
+            <a:spLocks noGrp="1"/>
+          </p:cNvSpPr>
+          <p:nvPr>
+            <p:ph idx="1"/>
+          </p:nvPr>
+        </p:nvSpPr>
+        <p:spPr>
+          <a:xfrm>
+            <a:off x="685800" y="2262294"/>
+            <a:ext cx="10820400" cy="4024125"/>
+          </a:xfrm>
+        </p:spPr>
+        <p:txBody>
+          <a:bodyPr>
+            <a:normAutofit lnSpcReduction="10000"/>
+          </a:bodyPr>
+          <a:lstStyle/>
+          <a:p>
+            <a:r>
+              <a:rPr lang="en-US" sz="2800" dirty="0" smtClean="0"/>
+              <a:t>Using K-means clustering</a:t>
+            </a:r>
+          </a:p>
+          <a:p>
+            <a:r>
+              <a:rPr lang="en-US" sz="2800" dirty="0" smtClean="0"/>
+              <a:t>Three distinct clusters were used</a:t>
+            </a:r>
+          </a:p>
+          <a:p>
+            <a:r>
+              <a:rPr lang="en-US" sz="2800" dirty="0" smtClean="0"/>
+              <a:t>The average rating produced for each cluster was compared</a:t>
+            </a:r>
+          </a:p>
+          <a:p>
+            <a:r>
+              <a:rPr lang="en-US" sz="2800" dirty="0" smtClean="0"/>
+              <a:t>Only 1 cluster had a positive rating</a:t>
+            </a:r>
+          </a:p>
+          <a:p>
+            <a:r>
+              <a:rPr lang="en-US" sz="2800" dirty="0" smtClean="0"/>
+              <a:t>It also contained the most clubs with positive ratings</a:t>
+            </a:r>
+          </a:p>
+          <a:p>
+            <a:r>
+              <a:rPr lang="en-US" sz="2800" dirty="0" smtClean="0"/>
+              <a:t>The neighborhood seemed more resilient to a downturn in the economy due to </a:t>
+            </a:r>
+            <a:r>
+              <a:rPr lang="en-US" sz="2800" dirty="0" err="1" smtClean="0"/>
+              <a:t>covid</a:t>
+            </a:r>
+            <a:r>
+              <a:rPr lang="en-US" sz="2800" dirty="0" smtClean="0"/>
+              <a:t>. More open clubs mean that location is fairing better.</a:t>
+            </a:r>
+          </a:p>
+          <a:p>
+            <a:pPr marL="0" indent="0">
+              <a:buNone/>
+            </a:pPr>
+            <a:endParaRPr lang="en-US" dirty="0"/>
+          </a:p>
+        </p:txBody>
+      </p:sp>
+    </p:spTree>
+    <p:extLst>
+      <p:ext uri="{BB962C8B-B14F-4D97-AF65-F5344CB8AC3E}">
+        <p14:creationId xmlns:p14="http://schemas.microsoft.com/office/powerpoint/2010/main" val="3201624142"/>
+      </p:ext>
+    </p:extLst>
+  </p:cSld>
+  <p:clrMapOvr>
+    <a:masterClrMapping/>
+  </p:clrMapOvr>
+</p:sld>
+</file>
+
+<file path=ppt/slides/slide14.xml><?xml version="1.0" encoding="utf-8"?>
+<p:sld xmlns:a="http://schemas.openxmlformats.org/drawingml/2006/main" xmlns:r="http://schemas.openxmlformats.org/officeDocument/2006/relationships" xmlns:p="http://schemas.openxmlformats.org/presentationml/2006/main">
+  <p:cSld>
+    <p:spTree>
+      <p:nvGrpSpPr>
+        <p:cNvPr id="1" name=""/>
+        <p:cNvGrpSpPr/>
+        <p:nvPr/>
+      </p:nvGrpSpPr>
+      <p:grpSpPr>
+        <a:xfrm>
+          <a:off x="0" y="0"/>
+          <a:ext cx="0" cy="0"/>
+          <a:chOff x="0" y="0"/>
+          <a:chExt cx="0" cy="0"/>
+        </a:xfrm>
+      </p:grpSpPr>
+      <p:sp>
+        <p:nvSpPr>
+          <p:cNvPr id="2" name="Title 1"/>
+          <p:cNvSpPr>
+            <a:spLocks noGrp="1"/>
+          </p:cNvSpPr>
+          <p:nvPr>
+            <p:ph type="title"/>
+          </p:nvPr>
+        </p:nvSpPr>
+        <p:spPr/>
+        <p:txBody>
+          <a:bodyPr/>
+          <a:lstStyle/>
+          <a:p>
+            <a:r>
+              <a:rPr lang="en-US" dirty="0" smtClean="0"/>
               <a:t>Conclusion and Future Directions</a:t>
             </a:r>
             <a:endParaRPr lang="en-US" dirty="0"/>
@@ -6197,7 +6287,107 @@
           <a:bodyPr/>
           <a:lstStyle/>
           <a:p>
-            <a:endParaRPr lang="en-US"/>
+            <a:r>
+              <a:rPr lang="en-US" dirty="0"/>
+              <a:t>The centroid of the cluster with the highest average rating is located within the bounds of </a:t>
+            </a:r>
+            <a:r>
+              <a:rPr lang="en-US" altLang="en-US" sz="2400" dirty="0">
+                <a:latin typeface="Courier New" panose="02070309020205020404" pitchFamily="49" charset="0"/>
+                <a:cs typeface="Courier New" panose="02070309020205020404" pitchFamily="49" charset="0"/>
+              </a:rPr>
+              <a:t>'</a:t>
+            </a:r>
+            <a:r>
+              <a:rPr lang="en-US" altLang="en-US" sz="2400" dirty="0" err="1">
+                <a:latin typeface="Courier New" panose="02070309020205020404" pitchFamily="49" charset="0"/>
+                <a:cs typeface="Courier New" panose="02070309020205020404" pitchFamily="49" charset="0"/>
+              </a:rPr>
+              <a:t>Hunters_Point_Sunnyside_West_Maspeth</a:t>
+            </a:r>
+            <a:r>
+              <a:rPr lang="en-US" altLang="en-US" sz="2400" dirty="0" smtClean="0">
+                <a:latin typeface="Courier New" panose="02070309020205020404" pitchFamily="49" charset="0"/>
+                <a:cs typeface="Courier New" panose="02070309020205020404" pitchFamily="49" charset="0"/>
+              </a:rPr>
+              <a:t>’ </a:t>
+            </a:r>
+            <a:r>
+              <a:rPr lang="en-US" altLang="en-US" dirty="0"/>
+              <a:t>boundary</a:t>
+            </a:r>
+            <a:endParaRPr lang="en-US" altLang="en-US" dirty="0"/>
+          </a:p>
+          <a:p>
+            <a:r>
+              <a:rPr lang="en-US" dirty="0"/>
+              <a:t>The closest </a:t>
+            </a:r>
+            <a:r>
+              <a:rPr lang="en-US" dirty="0" smtClean="0"/>
+              <a:t>Neighborhood center to the cluster centroid is </a:t>
+            </a:r>
+            <a:r>
+              <a:rPr lang="en-US" sz="2400" dirty="0">
+                <a:latin typeface="Courier New" panose="02070309020205020404" pitchFamily="49" charset="0"/>
+                <a:cs typeface="Courier New" panose="02070309020205020404" pitchFamily="49" charset="0"/>
+              </a:rPr>
+              <a:t>“Hunters Point</a:t>
+            </a:r>
+            <a:r>
+              <a:rPr lang="en-US" sz="2400" dirty="0" smtClean="0">
+                <a:latin typeface="Courier New" panose="02070309020205020404" pitchFamily="49" charset="0"/>
+                <a:cs typeface="Courier New" panose="02070309020205020404" pitchFamily="49" charset="0"/>
+              </a:rPr>
+              <a:t>”</a:t>
+            </a:r>
+          </a:p>
+          <a:p>
+            <a:r>
+              <a:rPr lang="en-US" dirty="0"/>
+              <a:t>These </a:t>
+            </a:r>
+            <a:r>
+              <a:rPr lang="en-US" dirty="0" smtClean="0"/>
+              <a:t>methods are </a:t>
+            </a:r>
+            <a:r>
+              <a:rPr lang="en-US" dirty="0"/>
+              <a:t>in </a:t>
+            </a:r>
+            <a:r>
+              <a:rPr lang="en-US" dirty="0" smtClean="0"/>
+              <a:t>agreement </a:t>
+            </a:r>
+            <a:r>
+              <a:rPr lang="en-US" dirty="0"/>
+              <a:t>so the </a:t>
+            </a:r>
+            <a:r>
+              <a:rPr lang="en-US" dirty="0" smtClean="0"/>
+              <a:t>neighborhood with clubs that have the highest average rating is “Hunters Point”</a:t>
+            </a:r>
+            <a:endParaRPr lang="en-US" dirty="0"/>
+          </a:p>
+          <a:p>
+            <a:r>
+              <a:rPr lang="en-US" dirty="0" smtClean="0"/>
+              <a:t>The analysis could be run again after the </a:t>
+            </a:r>
+            <a:r>
+              <a:rPr lang="en-US" dirty="0" err="1" smtClean="0"/>
+              <a:t>covid</a:t>
+            </a:r>
+            <a:r>
+              <a:rPr lang="en-US" dirty="0" smtClean="0"/>
+              <a:t> crisis ends. Many venues are currently closed, but this neighborhood seems to have the highest resiliency with clubs still open.</a:t>
+            </a:r>
+          </a:p>
+          <a:p>
+            <a:r>
+              <a:rPr lang="en-US" dirty="0" smtClean="0"/>
+              <a:t>This location may lead the recovery of the night club scene.</a:t>
+            </a:r>
           </a:p>
         </p:txBody>
       </p:sp>
@@ -6269,7 +6459,40 @@
           <a:bodyPr/>
           <a:lstStyle/>
           <a:p>
-            <a:endParaRPr lang="en-US"/>
+            <a:r>
+              <a:rPr lang="en-US" sz="2400" dirty="0" smtClean="0"/>
+              <a:t>Finding a location for a New Night club in New York City is the goal</a:t>
+            </a:r>
+          </a:p>
+          <a:p>
+            <a:r>
+              <a:rPr lang="en-US" sz="2400" dirty="0" smtClean="0"/>
+              <a:t>An optimal location would be one where other highly rated night clubs are located</a:t>
+            </a:r>
+          </a:p>
+          <a:p>
+            <a:r>
+              <a:rPr lang="en-US" sz="2400" dirty="0" smtClean="0"/>
+              <a:t>The assumption is club patrons will club hop switching from one club to another. (Even when there is a cover charge.)</a:t>
+            </a:r>
+          </a:p>
+          <a:p>
+            <a:r>
+              <a:rPr lang="en-US" sz="2400" dirty="0" smtClean="0"/>
+              <a:t>If a neighborhood is a hot spot for clubbing it will have numerous night clubs. Such a neighborhood is already attracting patrons so locating a club there would be beneficial. </a:t>
+            </a:r>
+          </a:p>
+          <a:p>
+            <a:r>
+              <a:rPr lang="en-US" sz="2400" dirty="0" smtClean="0"/>
+              <a:t>A new night spot which is in proximity will attract the curious. Walking distance and short taxi rides</a:t>
+            </a:r>
+          </a:p>
+          <a:p>
+            <a:pPr marL="0" indent="0">
+              <a:buNone/>
+            </a:pPr>
+            <a:endParaRPr lang="en-US" dirty="0"/>
           </a:p>
         </p:txBody>
       </p:sp>
@@ -6320,7 +6543,7 @@
           <a:p>
             <a:r>
               <a:rPr lang="en-US" dirty="0" smtClean="0"/>
-              <a:t>Data Acquisition and Cleaning</a:t>
+              <a:t>considerations</a:t>
             </a:r>
             <a:endParaRPr lang="en-US" dirty="0"/>
           </a:p>
@@ -6338,107 +6561,54 @@
         </p:nvSpPr>
         <p:spPr/>
         <p:txBody>
-          <a:bodyPr>
-            <a:normAutofit/>
-          </a:bodyPr>
-          <a:lstStyle/>
-          <a:p>
-            <a:r>
-              <a:rPr lang="en-US" dirty="0" smtClean="0"/>
-              <a:t>New York neighborhood data from Coursera assignment:</a:t>
-            </a:r>
-          </a:p>
-          <a:p>
-            <a:pPr lvl="1"/>
-            <a:r>
-              <a:rPr lang="en-US" dirty="0" smtClean="0"/>
-              <a:t>https</a:t>
-            </a:r>
-            <a:r>
-              <a:rPr lang="en-US" dirty="0"/>
-              <a:t>://geo.nyu.edu/catalog/nyu_2451_34572 </a:t>
-            </a:r>
-            <a:endParaRPr lang="en-US" dirty="0" smtClean="0"/>
-          </a:p>
-          <a:p>
-            <a:pPr lvl="1"/>
-            <a:r>
-              <a:rPr lang="en-US" dirty="0" smtClean="0"/>
-              <a:t>306 entries having latitude and longitude of geographical centers of neighborhoods</a:t>
-            </a:r>
-          </a:p>
-          <a:p>
-            <a:r>
-              <a:rPr lang="en-US" dirty="0" smtClean="0"/>
-              <a:t>New York boundary data from geo </a:t>
-            </a:r>
-            <a:r>
-              <a:rPr lang="en-US" dirty="0" err="1" smtClean="0"/>
-              <a:t>json</a:t>
-            </a:r>
-            <a:r>
-              <a:rPr lang="en-US" dirty="0" smtClean="0"/>
-              <a:t> file:</a:t>
-            </a:r>
-          </a:p>
-          <a:p>
-            <a:pPr lvl="1"/>
-            <a:r>
-              <a:rPr lang="en-US" dirty="0">
-                <a:hlinkClick r:id="rId2"/>
-              </a:rPr>
-              <a:t>https://</a:t>
-            </a:r>
-            <a:r>
-              <a:rPr lang="en-US" dirty="0" smtClean="0">
-                <a:hlinkClick r:id="rId2"/>
-              </a:rPr>
-              <a:t>github.com/veltman/snd3/blob/master/data/nyc-neighborhoods.geo.json</a:t>
-            </a:r>
-            <a:endParaRPr lang="en-US" dirty="0" smtClean="0"/>
-          </a:p>
-          <a:p>
-            <a:pPr lvl="1"/>
-            <a:r>
-              <a:rPr lang="en-US" dirty="0" smtClean="0"/>
-              <a:t>188 entries having the geographical boundaries of neighborhoods as polygons</a:t>
-            </a:r>
-          </a:p>
-          <a:p>
-            <a:pPr lvl="1"/>
-            <a:r>
-              <a:rPr lang="en-US" dirty="0" smtClean="0"/>
-              <a:t>Some neighborhoods were combined into single polygons</a:t>
-            </a:r>
-          </a:p>
-          <a:p>
-            <a:r>
-              <a:rPr lang="en-US" dirty="0" smtClean="0"/>
-              <a:t>Foursquare API used to get Night Clubs based on distance from </a:t>
-            </a:r>
-            <a:r>
-              <a:rPr lang="en-US" dirty="0" smtClean="0"/>
-              <a:t>geographical </a:t>
-            </a:r>
-            <a:r>
-              <a:rPr lang="en-US" dirty="0" smtClean="0"/>
-              <a:t>centers of </a:t>
-            </a:r>
-            <a:r>
-              <a:rPr lang="en-US" dirty="0" smtClean="0"/>
-              <a:t>neighborhoods</a:t>
-            </a:r>
-            <a:endParaRPr lang="en-US" dirty="0" smtClean="0"/>
-          </a:p>
-          <a:p>
-            <a:endParaRPr lang="en-US" dirty="0" smtClean="0"/>
+          <a:bodyPr/>
+          <a:lstStyle/>
+          <a:p>
+            <a:r>
+              <a:rPr lang="en-US" sz="2400" dirty="0"/>
+              <a:t>Many clubs are closed in New York City because of COVID-19</a:t>
+            </a:r>
+          </a:p>
+          <a:p>
+            <a:r>
+              <a:rPr lang="en-US" sz="2400" dirty="0"/>
+              <a:t>Data is </a:t>
+            </a:r>
+            <a:r>
+              <a:rPr lang="en-US" sz="2400" dirty="0" smtClean="0"/>
+              <a:t>limited through the </a:t>
+            </a:r>
+            <a:r>
+              <a:rPr lang="en-US" sz="2400" dirty="0" err="1" smtClean="0"/>
+              <a:t>FourSquare</a:t>
+            </a:r>
+            <a:r>
+              <a:rPr lang="en-US" sz="2400" dirty="0" smtClean="0"/>
+              <a:t> API</a:t>
+            </a:r>
+          </a:p>
+          <a:p>
+            <a:r>
+              <a:rPr lang="en-US" sz="2400" dirty="0" smtClean="0"/>
+              <a:t>There is less traffic and fewer patrons</a:t>
+            </a:r>
+          </a:p>
+          <a:p>
+            <a:r>
+              <a:rPr lang="en-US" sz="2400" dirty="0" smtClean="0"/>
+              <a:t>However, it is even more critical to find a location with clubs still open that are still rated highly.</a:t>
+            </a:r>
+            <a:endParaRPr lang="en-US" sz="2400" dirty="0"/>
+          </a:p>
+          <a:p>
+            <a:endParaRPr lang="en-US" dirty="0"/>
           </a:p>
         </p:txBody>
       </p:sp>
     </p:spTree>
     <p:extLst>
       <p:ext uri="{BB962C8B-B14F-4D97-AF65-F5344CB8AC3E}">
-        <p14:creationId xmlns:p14="http://schemas.microsoft.com/office/powerpoint/2010/main" val="2262478653"/>
+        <p14:creationId xmlns:p14="http://schemas.microsoft.com/office/powerpoint/2010/main" val="1347845431"/>
       </p:ext>
     </p:extLst>
   </p:cSld>
@@ -6482,40 +6652,129 @@
           <a:p>
             <a:r>
               <a:rPr lang="en-US" dirty="0" smtClean="0"/>
-              <a:t>Club Locations and Neighborhood centers</a:t>
+              <a:t>Data Acquisition and Cleaning</a:t>
             </a:r>
             <a:endParaRPr lang="en-US" dirty="0"/>
           </a:p>
         </p:txBody>
       </p:sp>
-      <p:pic>
-        <p:nvPicPr>
-          <p:cNvPr id="4" name="Picture 3"/>
-          <p:cNvPicPr>
-            <a:picLocks noChangeAspect="1"/>
-          </p:cNvPicPr>
-          <p:nvPr/>
-        </p:nvPicPr>
-        <p:blipFill>
-          <a:blip r:embed="rId2"/>
-          <a:stretch>
-            <a:fillRect/>
-          </a:stretch>
-        </p:blipFill>
-        <p:spPr>
-          <a:xfrm>
-            <a:off x="1577641" y="2057401"/>
-            <a:ext cx="7726167" cy="4645378"/>
-          </a:xfrm>
-          <a:prstGeom prst="rect">
-            <a:avLst/>
-          </a:prstGeom>
-        </p:spPr>
-      </p:pic>
+      <p:sp>
+        <p:nvSpPr>
+          <p:cNvPr id="3" name="Content Placeholder 2"/>
+          <p:cNvSpPr>
+            <a:spLocks noGrp="1"/>
+          </p:cNvSpPr>
+          <p:nvPr>
+            <p:ph idx="1"/>
+          </p:nvPr>
+        </p:nvSpPr>
+        <p:spPr/>
+        <p:txBody>
+          <a:bodyPr>
+            <a:normAutofit/>
+          </a:bodyPr>
+          <a:lstStyle/>
+          <a:p>
+            <a:r>
+              <a:rPr lang="en-US" dirty="0" smtClean="0"/>
+              <a:t>New York neighborhood data from Coursera assignment:</a:t>
+            </a:r>
+          </a:p>
+          <a:p>
+            <a:pPr lvl="1"/>
+            <a:r>
+              <a:rPr lang="en-US" dirty="0" smtClean="0">
+                <a:hlinkClick r:id="rId2"/>
+              </a:rPr>
+              <a:t>https</a:t>
+            </a:r>
+            <a:r>
+              <a:rPr lang="en-US" dirty="0">
+                <a:hlinkClick r:id="rId2"/>
+              </a:rPr>
+              <a:t>://geo.nyu.edu/catalog/nyu_2451_34572 </a:t>
+            </a:r>
+            <a:endParaRPr lang="en-US" dirty="0" smtClean="0"/>
+          </a:p>
+          <a:p>
+            <a:pPr lvl="1"/>
+            <a:r>
+              <a:rPr lang="en-US" dirty="0" smtClean="0"/>
+              <a:t>306 entries having latitude and longitude of geographical centers of neighborhoods</a:t>
+            </a:r>
+          </a:p>
+          <a:p>
+            <a:r>
+              <a:rPr lang="en-US" dirty="0" smtClean="0"/>
+              <a:t>New York boundary data from geo </a:t>
+            </a:r>
+            <a:r>
+              <a:rPr lang="en-US" dirty="0" err="1" smtClean="0"/>
+              <a:t>json</a:t>
+            </a:r>
+            <a:r>
+              <a:rPr lang="en-US" dirty="0" smtClean="0"/>
+              <a:t> file:</a:t>
+            </a:r>
+          </a:p>
+          <a:p>
+            <a:pPr lvl="1"/>
+            <a:r>
+              <a:rPr lang="en-US" dirty="0">
+                <a:hlinkClick r:id="rId3"/>
+              </a:rPr>
+              <a:t>https://</a:t>
+            </a:r>
+            <a:r>
+              <a:rPr lang="en-US" dirty="0" smtClean="0">
+                <a:hlinkClick r:id="rId3"/>
+              </a:rPr>
+              <a:t>github.com/veltman/snd3/blob/master/data/nyc-neighborhoods.geo.json</a:t>
+            </a:r>
+            <a:endParaRPr lang="en-US" dirty="0" smtClean="0"/>
+          </a:p>
+          <a:p>
+            <a:pPr lvl="1"/>
+            <a:r>
+              <a:rPr lang="en-US" dirty="0" smtClean="0"/>
+              <a:t>188 entries having the geographical boundaries of neighborhoods as polygons</a:t>
+            </a:r>
+          </a:p>
+          <a:p>
+            <a:pPr lvl="1"/>
+            <a:r>
+              <a:rPr lang="en-US" dirty="0" smtClean="0"/>
+              <a:t>Some neighborhoods were combined into single polygons</a:t>
+            </a:r>
+          </a:p>
+          <a:p>
+            <a:r>
+              <a:rPr lang="en-US" dirty="0" smtClean="0"/>
+              <a:t>Foursquare API used to get Night Clubs based on distance from </a:t>
+            </a:r>
+            <a:r>
+              <a:rPr lang="en-US" dirty="0" smtClean="0"/>
+              <a:t>geographical </a:t>
+            </a:r>
+            <a:r>
+              <a:rPr lang="en-US" dirty="0" smtClean="0"/>
+              <a:t>centers of </a:t>
+            </a:r>
+            <a:r>
+              <a:rPr lang="en-US" dirty="0" smtClean="0"/>
+              <a:t>neighborhoods</a:t>
+            </a:r>
+            <a:endParaRPr lang="en-US" dirty="0" smtClean="0"/>
+          </a:p>
+          <a:p>
+            <a:endParaRPr lang="en-US" dirty="0" smtClean="0"/>
+          </a:p>
+        </p:txBody>
+      </p:sp>
     </p:spTree>
     <p:extLst>
       <p:ext uri="{BB962C8B-B14F-4D97-AF65-F5344CB8AC3E}">
-        <p14:creationId xmlns:p14="http://schemas.microsoft.com/office/powerpoint/2010/main" val="2260558000"/>
+        <p14:creationId xmlns:p14="http://schemas.microsoft.com/office/powerpoint/2010/main" val="2262478653"/>
       </p:ext>
     </p:extLst>
   </p:cSld>
@@ -6559,7 +6818,7 @@
           <a:p>
             <a:r>
               <a:rPr lang="en-US" dirty="0" smtClean="0"/>
-              <a:t>Binning Clubs Geographically</a:t>
+              <a:t>Club Locations and Neighborhood centers</a:t>
             </a:r>
             <a:endParaRPr lang="en-US" dirty="0"/>
           </a:p>
@@ -6581,8 +6840,8 @@
         </p:blipFill>
         <p:spPr>
           <a:xfrm>
-            <a:off x="1602988" y="1930399"/>
-            <a:ext cx="7857101" cy="4712619"/>
+            <a:off x="1577641" y="2057401"/>
+            <a:ext cx="7726167" cy="4645378"/>
           </a:xfrm>
           <a:prstGeom prst="rect">
             <a:avLst/>
@@ -6592,7 +6851,7 @@
     </p:spTree>
     <p:extLst>
       <p:ext uri="{BB962C8B-B14F-4D97-AF65-F5344CB8AC3E}">
-        <p14:creationId xmlns:p14="http://schemas.microsoft.com/office/powerpoint/2010/main" val="906073736"/>
+        <p14:creationId xmlns:p14="http://schemas.microsoft.com/office/powerpoint/2010/main" val="2260558000"/>
       </p:ext>
     </p:extLst>
   </p:cSld>
@@ -6636,11 +6895,7 @@
           <a:p>
             <a:r>
               <a:rPr lang="en-US" dirty="0" smtClean="0"/>
-              <a:t>Ranking </a:t>
-            </a:r>
-            <a:r>
-              <a:rPr lang="en-US" dirty="0" smtClean="0"/>
-              <a:t>the  Top Neighborhoods</a:t>
+              <a:t>Binning Clubs Geographically</a:t>
             </a:r>
             <a:endParaRPr lang="en-US" dirty="0"/>
           </a:p>
@@ -6655,71 +6910,25 @@
           <p:nvPr/>
         </p:nvPicPr>
         <p:blipFill>
-          <a:blip r:embed="rId2">
-            <a:extLst>
-              <a:ext uri="{28A0092B-C50C-407E-A947-70E740481C1C}">
-                <a14:useLocalDpi xmlns:a14="http://schemas.microsoft.com/office/drawing/2010/main" val="0"/>
-              </a:ext>
-            </a:extLst>
-          </a:blip>
+          <a:blip r:embed="rId2"/>
           <a:stretch>
             <a:fillRect/>
           </a:stretch>
         </p:blipFill>
         <p:spPr>
           <a:xfrm>
-            <a:off x="1049866" y="2057401"/>
-            <a:ext cx="9313334" cy="4656668"/>
+            <a:off x="1602988" y="1930399"/>
+            <a:ext cx="7857101" cy="4712619"/>
           </a:xfrm>
           <a:prstGeom prst="rect">
             <a:avLst/>
           </a:prstGeom>
         </p:spPr>
       </p:pic>
-      <p:sp>
-        <p:nvSpPr>
-          <p:cNvPr id="3" name="Rectangle 2"/>
-          <p:cNvSpPr/>
-          <p:nvPr/>
-        </p:nvSpPr>
-        <p:spPr>
-          <a:xfrm>
-            <a:off x="1749778" y="2596445"/>
-            <a:ext cx="1264355" cy="4117624"/>
-          </a:xfrm>
-          <a:prstGeom prst="rect">
-            <a:avLst/>
-          </a:prstGeom>
-          <a:noFill/>
-          <a:ln w="38100"/>
-        </p:spPr>
-        <p:style>
-          <a:lnRef idx="2">
-            <a:schemeClr val="accent1"/>
-          </a:lnRef>
-          <a:fillRef idx="1">
-            <a:schemeClr val="lt1"/>
-          </a:fillRef>
-          <a:effectRef idx="0">
-            <a:schemeClr val="accent1"/>
-          </a:effectRef>
-          <a:fontRef idx="minor">
-            <a:schemeClr val="dk1"/>
-          </a:fontRef>
-        </p:style>
-        <p:txBody>
-          <a:bodyPr rtlCol="0" anchor="ctr"/>
-          <a:lstStyle/>
-          <a:p>
-            <a:pPr algn="ctr"/>
-            <a:endParaRPr lang="en-US"/>
-          </a:p>
-        </p:txBody>
-      </p:sp>
     </p:spTree>
     <p:extLst>
       <p:ext uri="{BB962C8B-B14F-4D97-AF65-F5344CB8AC3E}">
-        <p14:creationId xmlns:p14="http://schemas.microsoft.com/office/powerpoint/2010/main" val="1168981527"/>
+        <p14:creationId xmlns:p14="http://schemas.microsoft.com/office/powerpoint/2010/main" val="906073736"/>
       </p:ext>
     </p:extLst>
   </p:cSld>
@@ -6763,15 +6972,11 @@
           <a:p>
             <a:r>
               <a:rPr lang="en-US" dirty="0" smtClean="0"/>
-              <a:t>Five </a:t>
+              <a:t>Ranking </a:t>
             </a:r>
             <a:r>
               <a:rPr lang="en-US" dirty="0" smtClean="0"/>
-              <a:t>Neighborhoods </a:t>
-            </a:r>
-            <a:r>
-              <a:rPr lang="en-US" dirty="0" smtClean="0"/>
-              <a:t>with the most clubs</a:t>
+              <a:t>the  Top Neighborhoods</a:t>
             </a:r>
             <a:endParaRPr lang="en-US" dirty="0"/>
           </a:p>
@@ -6799,18 +7004,58 @@
         </p:blipFill>
         <p:spPr>
           <a:xfrm>
-            <a:off x="1083733" y="1961444"/>
-            <a:ext cx="9448800" cy="4724400"/>
+            <a:off x="1049866" y="2057401"/>
+            <a:ext cx="9313334" cy="4656668"/>
           </a:xfrm>
           <a:prstGeom prst="rect">
             <a:avLst/>
           </a:prstGeom>
         </p:spPr>
       </p:pic>
+      <p:sp>
+        <p:nvSpPr>
+          <p:cNvPr id="3" name="Rectangle 2"/>
+          <p:cNvSpPr/>
+          <p:nvPr/>
+        </p:nvSpPr>
+        <p:spPr>
+          <a:xfrm>
+            <a:off x="1749778" y="2596445"/>
+            <a:ext cx="1264355" cy="4117624"/>
+          </a:xfrm>
+          <a:prstGeom prst="rect">
+            <a:avLst/>
+          </a:prstGeom>
+          <a:noFill/>
+          <a:ln w="38100"/>
+        </p:spPr>
+        <p:style>
+          <a:lnRef idx="2">
+            <a:schemeClr val="accent1"/>
+          </a:lnRef>
+          <a:fillRef idx="1">
+            <a:schemeClr val="lt1"/>
+          </a:fillRef>
+          <a:effectRef idx="0">
+            <a:schemeClr val="accent1"/>
+          </a:effectRef>
+          <a:fontRef idx="minor">
+            <a:schemeClr val="dk1"/>
+          </a:fontRef>
+        </p:style>
+        <p:txBody>
+          <a:bodyPr rtlCol="0" anchor="ctr"/>
+          <a:lstStyle/>
+          <a:p>
+            <a:pPr algn="ctr"/>
+            <a:endParaRPr lang="en-US"/>
+          </a:p>
+        </p:txBody>
+      </p:sp>
     </p:spTree>
     <p:extLst>
       <p:ext uri="{BB962C8B-B14F-4D97-AF65-F5344CB8AC3E}">
-        <p14:creationId xmlns:p14="http://schemas.microsoft.com/office/powerpoint/2010/main" val="3490695413"/>
+        <p14:creationId xmlns:p14="http://schemas.microsoft.com/office/powerpoint/2010/main" val="1168981527"/>
       </p:ext>
     </p:extLst>
   </p:cSld>
@@ -6847,88 +7092,61 @@
             <p:ph type="title"/>
           </p:nvPr>
         </p:nvSpPr>
-        <p:spPr>
-          <a:xfrm>
-            <a:off x="2619022" y="764373"/>
-            <a:ext cx="8887178" cy="1293028"/>
-          </a:xfrm>
-        </p:spPr>
+        <p:spPr/>
         <p:txBody>
           <a:bodyPr/>
           <a:lstStyle/>
           <a:p>
             <a:r>
               <a:rPr lang="en-US" dirty="0" smtClean="0"/>
-              <a:t>Limitations Because of Covid-19</a:t>
+              <a:t>Five </a:t>
+            </a:r>
+            <a:r>
+              <a:rPr lang="en-US" dirty="0" smtClean="0"/>
+              <a:t>Neighborhoods </a:t>
+            </a:r>
+            <a:r>
+              <a:rPr lang="en-US" dirty="0" smtClean="0"/>
+              <a:t>with the most clubs</a:t>
             </a:r>
             <a:endParaRPr lang="en-US" dirty="0"/>
           </a:p>
         </p:txBody>
       </p:sp>
-      <p:sp>
-        <p:nvSpPr>
-          <p:cNvPr id="3" name="Content Placeholder 2"/>
-          <p:cNvSpPr>
-            <a:spLocks noGrp="1"/>
-          </p:cNvSpPr>
-          <p:nvPr>
-            <p:ph idx="1"/>
-          </p:nvPr>
-        </p:nvSpPr>
-        <p:spPr/>
-        <p:txBody>
-          <a:bodyPr/>
-          <a:lstStyle/>
-          <a:p>
-            <a:r>
-              <a:rPr lang="en-US" dirty="0" smtClean="0"/>
-              <a:t>Many clubs in New York at this time are closed</a:t>
-            </a:r>
-          </a:p>
-          <a:p>
-            <a:r>
-              <a:rPr lang="en-US" dirty="0" smtClean="0"/>
-              <a:t>Many clubs didn’t have foursquare IDs to pull additional information</a:t>
-            </a:r>
-          </a:p>
-          <a:p>
-            <a:r>
-              <a:rPr lang="en-US" dirty="0" smtClean="0"/>
-              <a:t>Rating information was not available on all Night Clubs because of the closing</a:t>
-            </a:r>
-          </a:p>
-          <a:p>
-            <a:r>
-              <a:rPr lang="en-US" dirty="0" smtClean="0"/>
-              <a:t>Any club that did not have a rating was assigned a penalty of -1. </a:t>
-            </a:r>
-          </a:p>
-          <a:p>
-            <a:pPr lvl="1"/>
-            <a:r>
-              <a:rPr lang="en-US" dirty="0" smtClean="0"/>
-              <a:t>Any areas with many closed clubs would have a large penalty</a:t>
-            </a:r>
-          </a:p>
-          <a:p>
-            <a:r>
-              <a:rPr lang="en-US" dirty="0" smtClean="0"/>
-              <a:t>The assumption is it’s better to open a club any club in an area with other open clubs instead of an area with no clubs.</a:t>
-            </a:r>
-          </a:p>
-          <a:p>
-            <a:r>
-              <a:rPr lang="en-US" dirty="0" smtClean="0"/>
-              <a:t>That is some night life is better than no night life</a:t>
-            </a:r>
-            <a:endParaRPr lang="en-US" dirty="0"/>
-          </a:p>
-        </p:txBody>
-      </p:sp>
+      <p:pic>
+        <p:nvPicPr>
+          <p:cNvPr id="4" name="Picture 3"/>
+          <p:cNvPicPr>
+            <a:picLocks noChangeAspect="1"/>
+          </p:cNvPicPr>
+          <p:nvPr/>
+        </p:nvPicPr>
+        <p:blipFill>
+          <a:blip r:embed="rId2">
+            <a:extLst>
+              <a:ext uri="{28A0092B-C50C-407E-A947-70E740481C1C}">
+                <a14:useLocalDpi xmlns:a14="http://schemas.microsoft.com/office/drawing/2010/main" val="0"/>
+              </a:ext>
+            </a:extLst>
+          </a:blip>
+          <a:stretch>
+            <a:fillRect/>
+          </a:stretch>
+        </p:blipFill>
+        <p:spPr>
+          <a:xfrm>
+            <a:off x="1083733" y="1961444"/>
+            <a:ext cx="9448800" cy="4724400"/>
+          </a:xfrm>
+          <a:prstGeom prst="rect">
+            <a:avLst/>
+          </a:prstGeom>
+        </p:spPr>
+      </p:pic>
     </p:spTree>
     <p:extLst>
       <p:ext uri="{BB962C8B-B14F-4D97-AF65-F5344CB8AC3E}">
-        <p14:creationId xmlns:p14="http://schemas.microsoft.com/office/powerpoint/2010/main" val="886729842"/>
+        <p14:creationId xmlns:p14="http://schemas.microsoft.com/office/powerpoint/2010/main" val="3490695413"/>
       </p:ext>
     </p:extLst>
   </p:cSld>
@@ -6965,6 +7183,34 @@
             <p:ph type="title"/>
           </p:nvPr>
         </p:nvSpPr>
+        <p:spPr>
+          <a:xfrm>
+            <a:off x="2619022" y="764373"/>
+            <a:ext cx="8887178" cy="1293028"/>
+          </a:xfrm>
+        </p:spPr>
+        <p:txBody>
+          <a:bodyPr/>
+          <a:lstStyle/>
+          <a:p>
+            <a:r>
+              <a:rPr lang="en-US" dirty="0" smtClean="0"/>
+              <a:t>Limitations Because of Covid-19</a:t>
+            </a:r>
+            <a:endParaRPr lang="en-US" dirty="0"/>
+          </a:p>
+        </p:txBody>
+      </p:sp>
+      <p:sp>
+        <p:nvSpPr>
+          <p:cNvPr id="3" name="Content Placeholder 2"/>
+          <p:cNvSpPr>
+            <a:spLocks noGrp="1"/>
+          </p:cNvSpPr>
+          <p:nvPr>
+            <p:ph idx="1"/>
+          </p:nvPr>
+        </p:nvSpPr>
         <p:spPr/>
         <p:txBody>
           <a:bodyPr/>
@@ -6972,46 +7218,53 @@
           <a:p>
             <a:r>
               <a:rPr lang="en-US" dirty="0" smtClean="0"/>
-              <a:t>Adding the Average Club Rating</a:t>
+              <a:t>Many clubs in New York at this time are closed</a:t>
+            </a:r>
+          </a:p>
+          <a:p>
+            <a:r>
+              <a:rPr lang="en-US" dirty="0" smtClean="0"/>
+              <a:t>Many clubs didn’t have foursquare IDs to pull additional information</a:t>
+            </a:r>
+          </a:p>
+          <a:p>
+            <a:r>
+              <a:rPr lang="en-US" dirty="0" smtClean="0"/>
+              <a:t>Rating information was not available on all Night Clubs because of the closing</a:t>
+            </a:r>
+          </a:p>
+          <a:p>
+            <a:r>
+              <a:rPr lang="en-US" dirty="0" smtClean="0"/>
+              <a:t>Any club that did not have a rating was assigned a penalty of -1. </a:t>
+            </a:r>
+          </a:p>
+          <a:p>
+            <a:pPr lvl="1"/>
+            <a:r>
+              <a:rPr lang="en-US" dirty="0" smtClean="0"/>
+              <a:t>Any areas with many closed clubs would have a large penalty</a:t>
+            </a:r>
+          </a:p>
+          <a:p>
+            <a:r>
+              <a:rPr lang="en-US" dirty="0" smtClean="0"/>
+              <a:t>The assumption is it’s better to open a club any club in an area with other open clubs instead of an area with no clubs.</a:t>
+            </a:r>
+          </a:p>
+          <a:p>
+            <a:r>
+              <a:rPr lang="en-US" dirty="0" smtClean="0"/>
+              <a:t>That is some night life is better than no night life</a:t>
             </a:r>
             <a:endParaRPr lang="en-US" dirty="0"/>
           </a:p>
         </p:txBody>
       </p:sp>
-      <p:pic>
-        <p:nvPicPr>
-          <p:cNvPr id="5" name="Picture 4"/>
-          <p:cNvPicPr>
-            <a:picLocks noChangeAspect="1"/>
-          </p:cNvPicPr>
-          <p:nvPr/>
-        </p:nvPicPr>
-        <p:blipFill>
-          <a:blip r:embed="rId2">
-            <a:extLst>
-              <a:ext uri="{28A0092B-C50C-407E-A947-70E740481C1C}">
-                <a14:useLocalDpi xmlns:a14="http://schemas.microsoft.com/office/drawing/2010/main" val="0"/>
-              </a:ext>
-            </a:extLst>
-          </a:blip>
-          <a:stretch>
-            <a:fillRect/>
-          </a:stretch>
-        </p:blipFill>
-        <p:spPr>
-          <a:xfrm>
-            <a:off x="974354" y="1930400"/>
-            <a:ext cx="9682806" cy="4820356"/>
-          </a:xfrm>
-          <a:prstGeom prst="rect">
-            <a:avLst/>
-          </a:prstGeom>
-        </p:spPr>
-      </p:pic>
     </p:spTree>
     <p:extLst>
       <p:ext uri="{BB962C8B-B14F-4D97-AF65-F5344CB8AC3E}">
-        <p14:creationId xmlns:p14="http://schemas.microsoft.com/office/powerpoint/2010/main" val="1269311814"/>
+        <p14:creationId xmlns:p14="http://schemas.microsoft.com/office/powerpoint/2010/main" val="886729842"/>
       </p:ext>
     </p:extLst>
   </p:cSld>

</xml_diff>

<commit_message>
Finished version, powerpoint, doc, and notebook
</commit_message>
<xml_diff>
--- a/Finding a Night Club Location in New York.pptx
+++ b/Finding a Night Club Location in New York.pptx
@@ -295,7 +295,7 @@
           <a:p>
             <a:fld id="{C7200705-572C-417B-BFC5-42B7735495C8}" type="datetimeFigureOut">
               <a:rPr lang="en-US" smtClean="0"/>
-              <a:t>2/14/2021</a:t>
+              <a:t>2/21/2021</a:t>
             </a:fld>
             <a:endParaRPr lang="en-US"/>
           </a:p>
@@ -562,7 +562,7 @@
           <a:p>
             <a:fld id="{C7200705-572C-417B-BFC5-42B7735495C8}" type="datetimeFigureOut">
               <a:rPr lang="en-US" smtClean="0"/>
-              <a:t>2/14/2021</a:t>
+              <a:t>2/21/2021</a:t>
             </a:fld>
             <a:endParaRPr lang="en-US"/>
           </a:p>
@@ -793,7 +793,7 @@
           <a:p>
             <a:fld id="{C7200705-572C-417B-BFC5-42B7735495C8}" type="datetimeFigureOut">
               <a:rPr lang="en-US" smtClean="0"/>
-              <a:t>2/14/2021</a:t>
+              <a:t>2/21/2021</a:t>
             </a:fld>
             <a:endParaRPr lang="en-US"/>
           </a:p>
@@ -1103,7 +1103,7 @@
           <a:p>
             <a:fld id="{C7200705-572C-417B-BFC5-42B7735495C8}" type="datetimeFigureOut">
               <a:rPr lang="en-US" smtClean="0"/>
-              <a:t>2/14/2021</a:t>
+              <a:t>2/21/2021</a:t>
             </a:fld>
             <a:endParaRPr lang="en-US"/>
           </a:p>
@@ -1576,7 +1576,7 @@
           <a:p>
             <a:fld id="{C7200705-572C-417B-BFC5-42B7735495C8}" type="datetimeFigureOut">
               <a:rPr lang="en-US" smtClean="0"/>
-              <a:t>2/14/2021</a:t>
+              <a:t>2/21/2021</a:t>
             </a:fld>
             <a:endParaRPr lang="en-US"/>
           </a:p>
@@ -2123,7 +2123,7 @@
           <a:p>
             <a:fld id="{C7200705-572C-417B-BFC5-42B7735495C8}" type="datetimeFigureOut">
               <a:rPr lang="en-US" smtClean="0"/>
-              <a:t>2/14/2021</a:t>
+              <a:t>2/21/2021</a:t>
             </a:fld>
             <a:endParaRPr lang="en-US"/>
           </a:p>
@@ -2897,7 +2897,7 @@
           <a:p>
             <a:fld id="{C7200705-572C-417B-BFC5-42B7735495C8}" type="datetimeFigureOut">
               <a:rPr lang="en-US" smtClean="0"/>
-              <a:t>2/14/2021</a:t>
+              <a:t>2/21/2021</a:t>
             </a:fld>
             <a:endParaRPr lang="en-US"/>
           </a:p>
@@ -3072,7 +3072,7 @@
           <a:p>
             <a:fld id="{C7200705-572C-417B-BFC5-42B7735495C8}" type="datetimeFigureOut">
               <a:rPr lang="en-US" smtClean="0"/>
-              <a:t>2/14/2021</a:t>
+              <a:t>2/21/2021</a:t>
             </a:fld>
             <a:endParaRPr lang="en-US"/>
           </a:p>
@@ -3295,7 +3295,7 @@
           <a:p>
             <a:fld id="{C7200705-572C-417B-BFC5-42B7735495C8}" type="datetimeFigureOut">
               <a:rPr lang="en-US" smtClean="0"/>
-              <a:t>2/14/2021</a:t>
+              <a:t>2/21/2021</a:t>
             </a:fld>
             <a:endParaRPr lang="en-US"/>
           </a:p>
@@ -3475,7 +3475,7 @@
           <a:p>
             <a:fld id="{C7200705-572C-417B-BFC5-42B7735495C8}" type="datetimeFigureOut">
               <a:rPr lang="en-US" smtClean="0"/>
-              <a:t>2/14/2021</a:t>
+              <a:t>2/21/2021</a:t>
             </a:fld>
             <a:endParaRPr lang="en-US"/>
           </a:p>
@@ -3764,7 +3764,7 @@
           <a:p>
             <a:fld id="{C7200705-572C-417B-BFC5-42B7735495C8}" type="datetimeFigureOut">
               <a:rPr lang="en-US" smtClean="0"/>
-              <a:t>2/14/2021</a:t>
+              <a:t>2/21/2021</a:t>
             </a:fld>
             <a:endParaRPr lang="en-US"/>
           </a:p>
@@ -4006,7 +4006,7 @@
           <a:p>
             <a:fld id="{C7200705-572C-417B-BFC5-42B7735495C8}" type="datetimeFigureOut">
               <a:rPr lang="en-US" smtClean="0"/>
-              <a:t>2/14/2021</a:t>
+              <a:t>2/21/2021</a:t>
             </a:fld>
             <a:endParaRPr lang="en-US"/>
           </a:p>
@@ -4385,7 +4385,7 @@
           <a:p>
             <a:fld id="{C7200705-572C-417B-BFC5-42B7735495C8}" type="datetimeFigureOut">
               <a:rPr lang="en-US" smtClean="0"/>
-              <a:t>2/14/2021</a:t>
+              <a:t>2/21/2021</a:t>
             </a:fld>
             <a:endParaRPr lang="en-US"/>
           </a:p>
@@ -4503,7 +4503,7 @@
           <a:p>
             <a:fld id="{C7200705-572C-417B-BFC5-42B7735495C8}" type="datetimeFigureOut">
               <a:rPr lang="en-US" smtClean="0"/>
-              <a:t>2/14/2021</a:t>
+              <a:t>2/21/2021</a:t>
             </a:fld>
             <a:endParaRPr lang="en-US"/>
           </a:p>
@@ -4598,7 +4598,7 @@
           <a:p>
             <a:fld id="{C7200705-572C-417B-BFC5-42B7735495C8}" type="datetimeFigureOut">
               <a:rPr lang="en-US" smtClean="0"/>
-              <a:t>2/14/2021</a:t>
+              <a:t>2/21/2021</a:t>
             </a:fld>
             <a:endParaRPr lang="en-US"/>
           </a:p>
@@ -4847,7 +4847,7 @@
           <a:p>
             <a:fld id="{C7200705-572C-417B-BFC5-42B7735495C8}" type="datetimeFigureOut">
               <a:rPr lang="en-US" smtClean="0"/>
-              <a:t>2/14/2021</a:t>
+              <a:t>2/21/2021</a:t>
             </a:fld>
             <a:endParaRPr lang="en-US"/>
           </a:p>
@@ -5104,7 +5104,7 @@
           <a:p>
             <a:fld id="{C7200705-572C-417B-BFC5-42B7735495C8}" type="datetimeFigureOut">
               <a:rPr lang="en-US" smtClean="0"/>
-              <a:t>2/14/2021</a:t>
+              <a:t>2/21/2021</a:t>
             </a:fld>
             <a:endParaRPr lang="en-US"/>
           </a:p>
@@ -5347,7 +5347,7 @@
           <a:p>
             <a:fld id="{C7200705-572C-417B-BFC5-42B7735495C8}" type="datetimeFigureOut">
               <a:rPr lang="en-US" smtClean="0"/>
-              <a:t>2/14/2021</a:t>
+              <a:t>2/21/2021</a:t>
             </a:fld>
             <a:endParaRPr lang="en-US"/>
           </a:p>
@@ -6316,7 +6316,6 @@
               <a:rPr lang="en-US" altLang="en-US" dirty="0"/>
               <a:t>boundary</a:t>
             </a:r>
-            <a:endParaRPr lang="en-US" altLang="en-US" dirty="0"/>
           </a:p>
           <a:p>
             <a:r>
@@ -6750,21 +6749,8 @@
           <a:p>
             <a:r>
               <a:rPr lang="en-US" dirty="0" smtClean="0"/>
-              <a:t>Foursquare API used to get Night Clubs based on distance from </a:t>
-            </a:r>
-            <a:r>
-              <a:rPr lang="en-US" dirty="0" smtClean="0"/>
-              <a:t>geographical </a:t>
-            </a:r>
-            <a:r>
-              <a:rPr lang="en-US" dirty="0" smtClean="0"/>
-              <a:t>centers of </a:t>
-            </a:r>
-            <a:r>
-              <a:rPr lang="en-US" dirty="0" smtClean="0"/>
-              <a:t>neighborhoods</a:t>
-            </a:r>
-            <a:endParaRPr lang="en-US" dirty="0" smtClean="0"/>
+              <a:t>Foursquare API used to get Night Clubs based on distance from geographical centers of neighborhoods</a:t>
+            </a:r>
           </a:p>
           <a:p>
             <a:endParaRPr lang="en-US" dirty="0" smtClean="0"/>
@@ -6972,11 +6958,7 @@
           <a:p>
             <a:r>
               <a:rPr lang="en-US" dirty="0" smtClean="0"/>
-              <a:t>Ranking </a:t>
-            </a:r>
-            <a:r>
-              <a:rPr lang="en-US" dirty="0" smtClean="0"/>
-              <a:t>the  Top Neighborhoods</a:t>
+              <a:t>Ranking the  Top Neighborhoods</a:t>
             </a:r>
             <a:endParaRPr lang="en-US" dirty="0"/>
           </a:p>
@@ -7099,15 +7081,7 @@
           <a:p>
             <a:r>
               <a:rPr lang="en-US" dirty="0" smtClean="0"/>
-              <a:t>Five </a:t>
-            </a:r>
-            <a:r>
-              <a:rPr lang="en-US" dirty="0" smtClean="0"/>
-              <a:t>Neighborhoods </a:t>
-            </a:r>
-            <a:r>
-              <a:rPr lang="en-US" dirty="0" smtClean="0"/>
-              <a:t>with the most clubs</a:t>
+              <a:t>Five Neighborhoods with the most clubs</a:t>
             </a:r>
             <a:endParaRPr lang="en-US" dirty="0"/>
           </a:p>

</xml_diff>